<commit_message>
draft de slide pour conclusion à revoir en séance
</commit_message>
<xml_diff>
--- a/report/Projet_classification_MLOps_Partie5_Eddie.pptx
+++ b/report/Projet_classification_MLOps_Partie5_Eddie.pptx
@@ -238,7 +238,7 @@
           <a:p>
             <a:fld id="{F352A77B-D33C-49B3-A83C-450AA2ED72B3}" type="datetimeFigureOut">
               <a:rPr lang="en-US" smtClean="0"/>
-              <a:t>2/11/2025</a:t>
+              <a:t>2/13/2025</a:t>
             </a:fld>
             <a:endParaRPr lang="en-US" dirty="0"/>
           </a:p>
@@ -415,7 +415,7 @@
           <a:p>
             <a:fld id="{E38D8F9A-F5CB-4EF8-A859-ED5E107B9763}" type="datetimeFigureOut">
               <a:rPr lang="en-US" smtClean="0"/>
-              <a:t>2/11/2025</a:t>
+              <a:t>2/13/2025</a:t>
             </a:fld>
             <a:endParaRPr lang="en-US" dirty="0"/>
           </a:p>
@@ -16633,22 +16633,88 @@
           <a:p>
             <a:r>
               <a:rPr lang="fr-FR" dirty="0"/>
+              <a:t>Même si on aurait aimé avoir le temps d’en faire plus:</a:t>
+            </a:r>
+          </a:p>
+          <a:p>
+            <a:pPr lvl="1"/>
+            <a:r>
+              <a:rPr lang="fr-FR" dirty="0"/>
+              <a:t>…avoir plus de tests de différents niveaux </a:t>
+            </a:r>
+            <a:r>
+              <a:rPr lang="fr-FR" dirty="0">
+                <a:sym typeface="Wingdings" panose="05000000000000000000" pitchFamily="2" charset="2"/>
+              </a:rPr>
+              <a:t> </a:t>
+            </a:r>
+            <a:r>
+              <a:rPr lang="fr-FR" dirty="0" err="1"/>
+              <a:t>refactoring</a:t>
+            </a:r>
+            <a:r>
+              <a:rPr lang="fr-FR" dirty="0"/>
+              <a:t> plus aisé…</a:t>
+            </a:r>
+          </a:p>
+          <a:p>
+            <a:pPr lvl="1"/>
+            <a:r>
+              <a:rPr lang="fr-FR" dirty="0"/>
+              <a:t>…avoir un réentrainement automatique en fonction du Model Drift…</a:t>
+            </a:r>
+          </a:p>
+          <a:p>
+            <a:pPr lvl="1"/>
+            <a:r>
+              <a:rPr lang="fr-FR" dirty="0"/>
+              <a:t>…une meilleure documentation…</a:t>
+            </a:r>
+          </a:p>
+          <a:p>
+            <a:r>
+              <a:rPr lang="fr-FR" dirty="0"/>
+              <a:t>Nous sommes fiers des résultats obtenus</a:t>
+            </a:r>
+          </a:p>
+          <a:p>
+            <a:pPr lvl="1"/>
+            <a:r>
+              <a:rPr lang="fr-FR" dirty="0"/>
+              <a:t>Réalisation des interfaces prévus au début du projet pour les cas métiers</a:t>
+            </a:r>
+          </a:p>
+          <a:p>
+            <a:pPr lvl="1"/>
+            <a:r>
+              <a:rPr lang="fr-FR" dirty="0"/>
+              <a:t>Une bonne collaboration d’équipe et un mode projet efficient</a:t>
+            </a:r>
+          </a:p>
+          <a:p>
+            <a:pPr lvl="1"/>
+            <a:r>
+              <a:rPr lang="fr-FR" dirty="0"/>
+              <a:t>Application pratique des connaissances acquises via la formation </a:t>
+            </a:r>
+            <a:r>
+              <a:rPr lang="fr-FR" dirty="0" err="1"/>
+              <a:t>MLOps</a:t>
+            </a:r>
+            <a:endParaRPr lang="fr-FR" dirty="0"/>
+          </a:p>
+          <a:p>
+            <a:r>
+              <a:rPr lang="fr-FR" dirty="0"/>
+              <a:t>Le futur</a:t>
+            </a:r>
+          </a:p>
+          <a:p>
+            <a:pPr lvl="1"/>
+            <a:r>
+              <a:rPr lang="fr-FR" dirty="0"/>
               <a:t>…</a:t>
             </a:r>
-          </a:p>
-          <a:p>
-            <a:r>
-              <a:rPr lang="fr-FR" dirty="0"/>
-              <a:t>Tests de </a:t>
-            </a:r>
-            <a:r>
-              <a:rPr lang="fr-FR"/>
-              <a:t>différents niveaux…</a:t>
-            </a:r>
-            <a:endParaRPr lang="fr-FR" dirty="0"/>
-          </a:p>
-          <a:p>
-            <a:endParaRPr lang="fr-FR" dirty="0"/>
           </a:p>
         </p:txBody>
       </p:sp>
@@ -17763,15 +17829,6 @@
 </file>
 
 <file path=customXml/item2.xml><?xml version="1.0" encoding="utf-8"?>
-<?mso-contentType ?>
-<FormTemplates xmlns="http://schemas.microsoft.com/sharepoint/v3/contenttype/forms">
-  <Display>DocumentLibraryForm</Display>
-  <Edit>DocumentLibraryForm</Edit>
-  <New>DocumentLibraryForm</New>
-</FormTemplates>
-</file>
-
-<file path=customXml/item3.xml><?xml version="1.0" encoding="utf-8"?>
 <p:properties xmlns:p="http://schemas.microsoft.com/office/2006/metadata/properties" xmlns:xsi="http://www.w3.org/2001/XMLSchema-instance" xmlns:pc="http://schemas.microsoft.com/office/infopath/2007/PartnerControls">
   <documentManagement>
     <_ip_UnifiedCompliancePolicyUIAction xmlns="http://schemas.microsoft.com/sharepoint/v3" xsi:nil="true"/>
@@ -17789,6 +17846,15 @@
     <MediaServiceKeyPoints xmlns="71af3243-3dd4-4a8d-8c0d-dd76da1f02a5" xsi:nil="true"/>
   </documentManagement>
 </p:properties>
+</file>
+
+<file path=customXml/item3.xml><?xml version="1.0" encoding="utf-8"?>
+<?mso-contentType ?>
+<FormTemplates xmlns="http://schemas.microsoft.com/sharepoint/v3/contenttype/forms">
+  <Display>DocumentLibraryForm</Display>
+  <Edit>DocumentLibraryForm</Edit>
+  <New>DocumentLibraryForm</New>
+</FormTemplates>
 </file>
 
 <file path=customXml/itemProps1.xml><?xml version="1.0" encoding="utf-8"?>
@@ -17813,14 +17879,6 @@
 </file>
 
 <file path=customXml/itemProps2.xml><?xml version="1.0" encoding="utf-8"?>
-<ds:datastoreItem xmlns:ds="http://schemas.openxmlformats.org/officeDocument/2006/customXml" ds:itemID="{79BF405E-7930-4D5C-ABB3-493E9D6D6CEA}">
-  <ds:schemaRefs>
-    <ds:schemaRef ds:uri="http://schemas.microsoft.com/sharepoint/v3/contenttype/forms"/>
-  </ds:schemaRefs>
-</ds:datastoreItem>
-</file>
-
-<file path=customXml/itemProps3.xml><?xml version="1.0" encoding="utf-8"?>
 <ds:datastoreItem xmlns:ds="http://schemas.openxmlformats.org/officeDocument/2006/customXml" ds:itemID="{6EA97235-BEC4-4F82-87A8-2F5DAD53B5F9}">
   <ds:schemaRefs>
     <ds:schemaRef ds:uri="http://schemas.microsoft.com/office/2006/metadata/properties"/>
@@ -17832,6 +17890,14 @@
 </ds:datastoreItem>
 </file>
 
+<file path=customXml/itemProps3.xml><?xml version="1.0" encoding="utf-8"?>
+<ds:datastoreItem xmlns:ds="http://schemas.openxmlformats.org/officeDocument/2006/customXml" ds:itemID="{79BF405E-7930-4D5C-ABB3-493E9D6D6CEA}">
+  <ds:schemaRefs>
+    <ds:schemaRef ds:uri="http://schemas.microsoft.com/sharepoint/v3/contenttype/forms"/>
+  </ds:schemaRefs>
+</ds:datastoreItem>
+</file>
+
 <file path=docMetadata/LabelInfo.xml><?xml version="1.0" encoding="utf-8"?>
 <clbl:labelList xmlns:clbl="http://schemas.microsoft.com/office/2020/mipLabelMetadata"/>
 </file>
</xml_diff>